<commit_message>
Add nertworking section. Secure topic incomplete.
</commit_message>
<xml_diff>
--- a/src/azure/architecting-microsoft-azure-solutions.pptx
+++ b/src/azure/architecting-microsoft-azure-solutions.pptx
@@ -127,7 +127,7 @@
 <p1510:revInfo xmlns:a="http://schemas.openxmlformats.org/drawingml/2006/main" xmlns:r="http://schemas.openxmlformats.org/officeDocument/2006/relationships" xmlns:p1510="http://schemas.microsoft.com/office/powerpoint/2015/10/main">
   <p1510:revLst>
     <p1510:client id="{AC65DF1B-BDBD-4C65-B800-57BC369A3079}" v="3" dt="2018-09-05T12:29:46.195"/>
-    <p1510:client id="{15C3C069-99D8-4210-BE71-84A0F6E1D5B8}" v="3756" dt="2018-09-06T04:14:14.125"/>
+    <p1510:client id="{15C3C069-99D8-4210-BE71-84A0F6E1D5B8}" v="3771" dt="2018-09-06T04:28:39.017"/>
   </p1510:revLst>
 </p1510:revInfo>
 </file>
@@ -566,7 +566,7 @@
           <a:p>
             <a:fld id="{D18B56EA-E28F-4F92-9F16-7A6F2501B303}" type="datetime8">
               <a:rPr lang="en-US" smtClean="0"/>
-              <a:t>9/5/2018 7:54 PM</a:t>
+              <a:t>9/5/2018 9:27 PM</a:t>
             </a:fld>
             <a:endParaRPr lang="en-US" dirty="0"/>
           </a:p>
@@ -8668,45 +8668,6 @@
           </p:txBody>
         </p:sp>
       </p:grpSp>
-      <p:pic>
-        <p:nvPicPr>
-          <p:cNvPr id="6" name="Picture 5">
-            <a:extLst>
-              <a:ext uri="{FF2B5EF4-FFF2-40B4-BE49-F238E27FC236}">
-                <a16:creationId xmlns:a16="http://schemas.microsoft.com/office/drawing/2014/main" id="{4A4EDF68-1FD6-401D-AABF-E144FBECD51A}"/>
-              </a:ext>
-            </a:extLst>
-          </p:cNvPr>
-          <p:cNvPicPr>
-            <a:picLocks noChangeAspect="1"/>
-          </p:cNvPicPr>
-          <p:nvPr/>
-        </p:nvPicPr>
-        <p:blipFill>
-          <a:blip r:embed="rId3">
-            <a:extLst>
-              <a:ext uri="{28A0092B-C50C-407E-A947-70E740481C1C}">
-                <a14:useLocalDpi xmlns:a14="http://schemas.microsoft.com/office/drawing/2010/main" val="0"/>
-              </a:ext>
-              <a:ext uri="{837473B0-CC2E-450A-ABE3-18F120FF3D39}">
-                <a1611:picAttrSrcUrl xmlns:a1611="http://schemas.microsoft.com/office/drawing/2016/11/main" r:id="rId4"/>
-              </a:ext>
-            </a:extLst>
-          </a:blip>
-          <a:stretch>
-            <a:fillRect/>
-          </a:stretch>
-        </p:blipFill>
-        <p:spPr>
-          <a:xfrm>
-            <a:off x="5292306" y="7713214"/>
-            <a:ext cx="9982821" cy="3150828"/>
-          </a:xfrm>
-          <a:prstGeom prst="rect">
-            <a:avLst/>
-          </a:prstGeom>
-        </p:spPr>
-      </p:pic>
       <p:grpSp>
         <p:nvGrpSpPr>
           <p:cNvPr id="9" name="Group 8">
@@ -12902,6 +12863,45 @@
           </p:txBody>
         </p:sp>
       </p:grpSp>
+      <p:pic>
+        <p:nvPicPr>
+          <p:cNvPr id="6" name="Picture 5">
+            <a:extLst>
+              <a:ext uri="{FF2B5EF4-FFF2-40B4-BE49-F238E27FC236}">
+                <a16:creationId xmlns:a16="http://schemas.microsoft.com/office/drawing/2014/main" id="{4A4EDF68-1FD6-401D-AABF-E144FBECD51A}"/>
+              </a:ext>
+            </a:extLst>
+          </p:cNvPr>
+          <p:cNvPicPr>
+            <a:picLocks noChangeAspect="1"/>
+          </p:cNvPicPr>
+          <p:nvPr/>
+        </p:nvPicPr>
+        <p:blipFill>
+          <a:blip r:embed="rId3">
+            <a:extLst>
+              <a:ext uri="{28A0092B-C50C-407E-A947-70E740481C1C}">
+                <a14:useLocalDpi xmlns:a14="http://schemas.microsoft.com/office/drawing/2010/main" val="0"/>
+              </a:ext>
+              <a:ext uri="{837473B0-CC2E-450A-ABE3-18F120FF3D39}">
+                <a1611:picAttrSrcUrl xmlns:a1611="http://schemas.microsoft.com/office/drawing/2016/11/main" r:id="rId4"/>
+              </a:ext>
+            </a:extLst>
+          </a:blip>
+          <a:stretch>
+            <a:fillRect/>
+          </a:stretch>
+        </p:blipFill>
+        <p:spPr>
+          <a:xfrm rot="1684251">
+            <a:off x="2513108" y="3970013"/>
+            <a:ext cx="9982821" cy="3150828"/>
+          </a:xfrm>
+          <a:prstGeom prst="rect">
+            <a:avLst/>
+          </a:prstGeom>
+        </p:spPr>
+      </p:pic>
     </p:spTree>
     <p:extLst>
       <p:ext uri="{BB962C8B-B14F-4D97-AF65-F5344CB8AC3E}">

</xml_diff>

<commit_message>
Completed the first DRAFT of all three posters.
</commit_message>
<xml_diff>
--- a/src/azure/architecting-microsoft-azure-solutions.pptx
+++ b/src/azure/architecting-microsoft-azure-solutions.pptx
@@ -214,7 +214,7 @@
           <a:p>
             <a:fld id="{2F4766DD-CA99-4D5F-A9B2-EF5EF0A37C93}" type="datetimeFigureOut">
               <a:rPr lang="en-CA" smtClean="0"/>
-              <a:t>2018-10-05</a:t>
+              <a:t>2018-10-06</a:t>
             </a:fld>
             <a:endParaRPr lang="en-CA"/>
           </a:p>
@@ -566,7 +566,7 @@
           <a:p>
             <a:fld id="{D18B56EA-E28F-4F92-9F16-7A6F2501B303}" type="datetime8">
               <a:rPr lang="en-US" smtClean="0"/>
-              <a:t>10/5/2018 6:07 PM</a:t>
+              <a:t>10/6/2018 8:12 AM</a:t>
             </a:fld>
             <a:endParaRPr lang="en-US" dirty="0"/>
           </a:p>
@@ -5509,7 +5509,7 @@
           <a:p>
             <a:fld id="{ED6EB527-6926-47A2-AB35-8907638AD74C}" type="datetimeFigureOut">
               <a:rPr lang="en-CA" smtClean="0"/>
-              <a:t>2018-10-05</a:t>
+              <a:t>2018-10-06</a:t>
             </a:fld>
             <a:endParaRPr lang="en-CA"/>
           </a:p>
@@ -26132,9 +26132,9 @@
         <p:grpSpPr>
           <a:xfrm>
             <a:off x="481250" y="6378408"/>
-            <a:ext cx="2986571" cy="2494372"/>
+            <a:ext cx="2986571" cy="2306593"/>
             <a:chOff x="1409999" y="881288"/>
-            <a:chExt cx="2986571" cy="2494372"/>
+            <a:chExt cx="2986571" cy="2306593"/>
           </a:xfrm>
         </p:grpSpPr>
         <p:sp>
@@ -26239,7 +26239,7 @@
           <p:spPr bwMode="auto">
             <a:xfrm>
               <a:off x="1410000" y="1237886"/>
-              <a:ext cx="2986570" cy="2137774"/>
+              <a:ext cx="2986570" cy="1949995"/>
             </a:xfrm>
             <a:prstGeom prst="rect">
               <a:avLst/>
@@ -26298,7 +26298,7 @@
                   <a:ea typeface="Segoe UI" pitchFamily="34" charset="0"/>
                   <a:cs typeface="Segoe UI" pitchFamily="34" charset="0"/>
                 </a:rPr>
-                <a:t>X</a:t>
+                <a:t>Automation ensures consistency and saves time</a:t>
               </a:r>
             </a:p>
             <a:p>
@@ -26322,7 +26322,361 @@
                   </a:solidFill>
                   <a:cs typeface="Segoe UI" pitchFamily="34" charset="0"/>
                 </a:rPr>
-                <a:t>X</a:t>
+                <a:t>Development, testing, acceptance, and production</a:t>
+              </a:r>
+            </a:p>
+            <a:p>
+              <a:pPr marL="269875" lvl="1" indent="-93663" defTabSz="932472" fontAlgn="base">
+                <a:lnSpc>
+                  <a:spcPct val="90000"/>
+                </a:lnSpc>
+                <a:spcBef>
+                  <a:spcPct val="0"/>
+                </a:spcBef>
+                <a:spcAft>
+                  <a:spcPct val="0"/>
+                </a:spcAft>
+                <a:buFont typeface="Arial" panose="020B0604020202020204" pitchFamily="34" charset="0"/>
+                <a:buChar char="•"/>
+              </a:pPr>
+              <a:r>
+                <a:rPr lang="en-CA" sz="800" dirty="0">
+                  <a:solidFill>
+                    <a:srgbClr val="0070C0"/>
+                  </a:solidFill>
+                  <a:cs typeface="Segoe UI" pitchFamily="34" charset="0"/>
+                </a:rPr>
+                <a:t>PowerShell – create resources and configure</a:t>
+              </a:r>
+            </a:p>
+            <a:p>
+              <a:pPr marL="269875" lvl="1" indent="-93663" defTabSz="932472" fontAlgn="base">
+                <a:lnSpc>
+                  <a:spcPct val="90000"/>
+                </a:lnSpc>
+                <a:spcBef>
+                  <a:spcPct val="0"/>
+                </a:spcBef>
+                <a:spcAft>
+                  <a:spcPct val="0"/>
+                </a:spcAft>
+                <a:buFont typeface="Arial" panose="020B0604020202020204" pitchFamily="34" charset="0"/>
+                <a:buChar char="•"/>
+              </a:pPr>
+              <a:r>
+                <a:rPr lang="en-CA" sz="800" dirty="0">
+                  <a:solidFill>
+                    <a:srgbClr val="0070C0"/>
+                  </a:solidFill>
+                  <a:cs typeface="Segoe UI" pitchFamily="34" charset="0"/>
+                </a:rPr>
+                <a:t>Desired State Configuration (DSC) – enforce config</a:t>
+              </a:r>
+            </a:p>
+            <a:p>
+              <a:pPr marL="360363" lvl="1" indent="-92075" defTabSz="932472" fontAlgn="base">
+                <a:lnSpc>
+                  <a:spcPct val="90000"/>
+                </a:lnSpc>
+                <a:spcBef>
+                  <a:spcPct val="0"/>
+                </a:spcBef>
+                <a:spcAft>
+                  <a:spcPct val="0"/>
+                </a:spcAft>
+                <a:buFont typeface="Arial" panose="020B0604020202020204" pitchFamily="34" charset="0"/>
+                <a:buChar char="•"/>
+              </a:pPr>
+              <a:r>
+                <a:rPr lang="en-CA" sz="800" dirty="0">
+                  <a:solidFill>
+                    <a:srgbClr val="0070C0"/>
+                  </a:solidFill>
+                  <a:cs typeface="Segoe UI" pitchFamily="34" charset="0"/>
+                </a:rPr>
+                <a:t>Features: Configurations, Resources, Local Config Mgr.</a:t>
+              </a:r>
+            </a:p>
+            <a:p>
+              <a:pPr marL="268288" lvl="1" indent="-92075" defTabSz="932472" fontAlgn="base">
+                <a:lnSpc>
+                  <a:spcPct val="90000"/>
+                </a:lnSpc>
+                <a:spcBef>
+                  <a:spcPct val="0"/>
+                </a:spcBef>
+                <a:spcAft>
+                  <a:spcPct val="0"/>
+                </a:spcAft>
+                <a:buFont typeface="Arial" panose="020B0604020202020204" pitchFamily="34" charset="0"/>
+                <a:buChar char="•"/>
+              </a:pPr>
+              <a:r>
+                <a:rPr lang="en-CA" sz="800" dirty="0">
+                  <a:solidFill>
+                    <a:srgbClr val="0070C0"/>
+                  </a:solidFill>
+                  <a:cs typeface="Segoe UI" pitchFamily="34" charset="0"/>
+                </a:rPr>
+                <a:t>Azure Automation</a:t>
+              </a:r>
+            </a:p>
+            <a:p>
+              <a:pPr marL="360363" lvl="1" indent="-92075" defTabSz="932472" fontAlgn="base">
+                <a:lnSpc>
+                  <a:spcPct val="90000"/>
+                </a:lnSpc>
+                <a:spcBef>
+                  <a:spcPct val="0"/>
+                </a:spcBef>
+                <a:spcAft>
+                  <a:spcPct val="0"/>
+                </a:spcAft>
+                <a:buFont typeface="Arial" panose="020B0604020202020204" pitchFamily="34" charset="0"/>
+                <a:buChar char="•"/>
+              </a:pPr>
+              <a:r>
+                <a:rPr lang="en-CA" sz="800" dirty="0">
+                  <a:solidFill>
+                    <a:srgbClr val="0070C0"/>
+                  </a:solidFill>
+                  <a:cs typeface="Segoe UI" pitchFamily="34" charset="0"/>
+                </a:rPr>
+                <a:t>Process Automation – automate management</a:t>
+              </a:r>
+            </a:p>
+            <a:p>
+              <a:pPr marL="360363" lvl="1" indent="-92075" defTabSz="932472" fontAlgn="base">
+                <a:lnSpc>
+                  <a:spcPct val="90000"/>
+                </a:lnSpc>
+                <a:spcBef>
+                  <a:spcPct val="0"/>
+                </a:spcBef>
+                <a:spcAft>
+                  <a:spcPct val="0"/>
+                </a:spcAft>
+                <a:buFont typeface="Arial" panose="020B0604020202020204" pitchFamily="34" charset="0"/>
+                <a:buChar char="•"/>
+              </a:pPr>
+              <a:r>
+                <a:rPr lang="en-CA" sz="800" dirty="0">
+                  <a:solidFill>
+                    <a:srgbClr val="0070C0"/>
+                  </a:solidFill>
+                  <a:cs typeface="Segoe UI" pitchFamily="34" charset="0"/>
+                </a:rPr>
+                <a:t>Configuration Management – DSC, PowerShell</a:t>
+              </a:r>
+            </a:p>
+            <a:p>
+              <a:pPr marL="360363" lvl="1" indent="-92075" defTabSz="932472" fontAlgn="base">
+                <a:lnSpc>
+                  <a:spcPct val="90000"/>
+                </a:lnSpc>
+                <a:spcBef>
+                  <a:spcPct val="0"/>
+                </a:spcBef>
+                <a:spcAft>
+                  <a:spcPct val="0"/>
+                </a:spcAft>
+                <a:buFont typeface="Arial" panose="020B0604020202020204" pitchFamily="34" charset="0"/>
+                <a:buChar char="•"/>
+              </a:pPr>
+              <a:r>
+                <a:rPr lang="en-CA" sz="800" dirty="0">
+                  <a:solidFill>
+                    <a:srgbClr val="0070C0"/>
+                  </a:solidFill>
+                  <a:cs typeface="Segoe UI" pitchFamily="34" charset="0"/>
+                </a:rPr>
+                <a:t>Update Management – Cloud + on-prem environments</a:t>
+              </a:r>
+            </a:p>
+            <a:p>
+              <a:pPr marL="360363" lvl="1" indent="-92075" defTabSz="932472" fontAlgn="base">
+                <a:lnSpc>
+                  <a:spcPct val="90000"/>
+                </a:lnSpc>
+                <a:spcBef>
+                  <a:spcPct val="0"/>
+                </a:spcBef>
+                <a:spcAft>
+                  <a:spcPct val="0"/>
+                </a:spcAft>
+                <a:buFont typeface="Arial" panose="020B0604020202020204" pitchFamily="34" charset="0"/>
+                <a:buChar char="•"/>
+              </a:pPr>
+              <a:r>
+                <a:rPr lang="en-CA" sz="800" dirty="0">
+                  <a:solidFill>
+                    <a:srgbClr val="0070C0"/>
+                  </a:solidFill>
+                  <a:cs typeface="Segoe UI" pitchFamily="34" charset="0"/>
+                </a:rPr>
+                <a:t>Shared capabilities</a:t>
+              </a:r>
+            </a:p>
+            <a:p>
+              <a:pPr marL="268288" lvl="1" indent="-92075" defTabSz="932472" fontAlgn="base">
+                <a:lnSpc>
+                  <a:spcPct val="90000"/>
+                </a:lnSpc>
+                <a:spcBef>
+                  <a:spcPct val="0"/>
+                </a:spcBef>
+                <a:spcAft>
+                  <a:spcPct val="0"/>
+                </a:spcAft>
+                <a:buFont typeface="Arial" panose="020B0604020202020204" pitchFamily="34" charset="0"/>
+                <a:buChar char="•"/>
+              </a:pPr>
+              <a:r>
+                <a:rPr lang="en-CA" sz="800" dirty="0">
+                  <a:solidFill>
+                    <a:srgbClr val="0070C0"/>
+                  </a:solidFill>
+                  <a:cs typeface="Segoe UI" pitchFamily="34" charset="0"/>
+                </a:rPr>
+                <a:t>3</a:t>
+              </a:r>
+              <a:r>
+                <a:rPr lang="en-CA" sz="800" baseline="30000" dirty="0">
+                  <a:solidFill>
+                    <a:srgbClr val="0070C0"/>
+                  </a:solidFill>
+                  <a:cs typeface="Segoe UI" pitchFamily="34" charset="0"/>
+                </a:rPr>
+                <a:t>rd</a:t>
+              </a:r>
+              <a:r>
+                <a:rPr lang="en-CA" sz="800" dirty="0">
+                  <a:solidFill>
+                    <a:srgbClr val="0070C0"/>
+                  </a:solidFill>
+                  <a:cs typeface="Segoe UI" pitchFamily="34" charset="0"/>
+                </a:rPr>
+                <a:t> Party</a:t>
+              </a:r>
+            </a:p>
+            <a:p>
+              <a:pPr marL="360363" lvl="1" indent="-92075" defTabSz="932472" fontAlgn="base">
+                <a:lnSpc>
+                  <a:spcPct val="90000"/>
+                </a:lnSpc>
+                <a:spcBef>
+                  <a:spcPct val="0"/>
+                </a:spcBef>
+                <a:spcAft>
+                  <a:spcPct val="0"/>
+                </a:spcAft>
+                <a:buFont typeface="Arial" panose="020B0604020202020204" pitchFamily="34" charset="0"/>
+                <a:buChar char="•"/>
+              </a:pPr>
+              <a:r>
+                <a:rPr lang="en-CA" sz="800" dirty="0">
+                  <a:solidFill>
+                    <a:srgbClr val="0070C0"/>
+                  </a:solidFill>
+                  <a:cs typeface="Segoe UI" pitchFamily="34" charset="0"/>
+                </a:rPr>
+                <a:t>Chef – virtual and physical config management, Windows + Linux + Mac</a:t>
+              </a:r>
+            </a:p>
+            <a:p>
+              <a:pPr marL="360363" lvl="1" indent="-92075" defTabSz="932472" fontAlgn="base">
+                <a:lnSpc>
+                  <a:spcPct val="90000"/>
+                </a:lnSpc>
+                <a:spcBef>
+                  <a:spcPct val="0"/>
+                </a:spcBef>
+                <a:spcAft>
+                  <a:spcPct val="0"/>
+                </a:spcAft>
+                <a:buFont typeface="Arial" panose="020B0604020202020204" pitchFamily="34" charset="0"/>
+                <a:buChar char="•"/>
+              </a:pPr>
+              <a:r>
+                <a:rPr lang="en-CA" sz="800" dirty="0">
+                  <a:solidFill>
+                    <a:srgbClr val="0070C0"/>
+                  </a:solidFill>
+                  <a:cs typeface="Segoe UI" pitchFamily="34" charset="0"/>
+                </a:rPr>
+                <a:t>Puppet</a:t>
+              </a:r>
+            </a:p>
+            <a:p>
+              <a:pPr marL="268288" lvl="1" indent="-92075" defTabSz="932472" fontAlgn="base">
+                <a:lnSpc>
+                  <a:spcPct val="90000"/>
+                </a:lnSpc>
+                <a:spcBef>
+                  <a:spcPct val="0"/>
+                </a:spcBef>
+                <a:spcAft>
+                  <a:spcPct val="0"/>
+                </a:spcAft>
+                <a:buFont typeface="Arial" panose="020B0604020202020204" pitchFamily="34" charset="0"/>
+                <a:buChar char="•"/>
+              </a:pPr>
+              <a:r>
+                <a:rPr lang="en-CA" sz="800" dirty="0">
+                  <a:solidFill>
+                    <a:srgbClr val="0070C0"/>
+                  </a:solidFill>
+                  <a:cs typeface="Segoe UI" pitchFamily="34" charset="0"/>
+                </a:rPr>
+                <a:t>Azure Event Grid – supports automation tasks</a:t>
+              </a:r>
+            </a:p>
+            <a:p>
+              <a:pPr marL="268288" lvl="1" indent="-92075" defTabSz="932472" fontAlgn="base">
+                <a:lnSpc>
+                  <a:spcPct val="90000"/>
+                </a:lnSpc>
+                <a:spcBef>
+                  <a:spcPct val="0"/>
+                </a:spcBef>
+                <a:spcAft>
+                  <a:spcPct val="0"/>
+                </a:spcAft>
+                <a:buFont typeface="Arial" panose="020B0604020202020204" pitchFamily="34" charset="0"/>
+                <a:buChar char="•"/>
+              </a:pPr>
+              <a:r>
+                <a:rPr lang="en-CA" sz="800" dirty="0">
+                  <a:solidFill>
+                    <a:srgbClr val="0070C0"/>
+                  </a:solidFill>
+                  <a:cs typeface="Segoe UI" pitchFamily="34" charset="0"/>
+                </a:rPr>
+                <a:t>Azure Logic Apps – supports call to automation runbooks</a:t>
+              </a:r>
+            </a:p>
+            <a:p>
+              <a:pPr marL="268288" lvl="1" indent="-92075" defTabSz="932472" fontAlgn="base">
+                <a:lnSpc>
+                  <a:spcPct val="90000"/>
+                </a:lnSpc>
+                <a:spcBef>
+                  <a:spcPct val="0"/>
+                </a:spcBef>
+                <a:spcAft>
+                  <a:spcPct val="0"/>
+                </a:spcAft>
+                <a:buFont typeface="Arial" panose="020B0604020202020204" pitchFamily="34" charset="0"/>
+                <a:buChar char="•"/>
+              </a:pPr>
+              <a:r>
+                <a:rPr lang="en-CA" sz="800" dirty="0">
+                  <a:solidFill>
+                    <a:srgbClr val="0070C0"/>
+                  </a:solidFill>
+                  <a:cs typeface="Segoe UI" pitchFamily="34" charset="0"/>
+                </a:rPr>
+                <a:t>Azure DevOps – CI/CD</a:t>
               </a:r>
             </a:p>
           </p:txBody>
@@ -26343,9 +26697,9 @@
         <p:grpSpPr>
           <a:xfrm>
             <a:off x="3736895" y="6378408"/>
-            <a:ext cx="2891817" cy="2496297"/>
+            <a:ext cx="2891817" cy="1621763"/>
             <a:chOff x="4520351" y="881287"/>
-            <a:chExt cx="2986571" cy="2496297"/>
+            <a:chExt cx="2986571" cy="1621763"/>
           </a:xfrm>
         </p:grpSpPr>
         <p:sp>
@@ -26450,7 +26804,7 @@
           <p:spPr bwMode="auto">
             <a:xfrm>
               <a:off x="4520352" y="1237886"/>
-              <a:ext cx="2986570" cy="2139698"/>
+              <a:ext cx="2986570" cy="1265164"/>
             </a:xfrm>
             <a:prstGeom prst="rect">
               <a:avLst/>
@@ -26509,7 +26863,7 @@
                   <a:ea typeface="Segoe UI" pitchFamily="34" charset="0"/>
                   <a:cs typeface="Segoe UI" pitchFamily="34" charset="0"/>
                 </a:rPr>
-                <a:t>X</a:t>
+                <a:t>Meet performance and SLA requirements</a:t>
               </a:r>
             </a:p>
             <a:p>
@@ -26534,15 +26888,158 @@
                   <a:ea typeface="Segoe UI" pitchFamily="34" charset="0"/>
                   <a:cs typeface="Segoe UI" pitchFamily="34" charset="0"/>
                 </a:rPr>
-                <a:t>X</a:t>
+                <a:t>Vertical scaling – change VM sizes</a:t>
               </a:r>
-              <a:endParaRPr lang="en-CA" sz="900" dirty="0">
-                <a:solidFill>
-                  <a:srgbClr val="0070C0"/>
-                </a:solidFill>
-                <a:ea typeface="Segoe UI" pitchFamily="34" charset="0"/>
-                <a:cs typeface="Segoe UI" pitchFamily="34" charset="0"/>
-              </a:endParaRPr>
+            </a:p>
+            <a:p>
+              <a:pPr marL="269875" lvl="1" indent="-93663" defTabSz="932472" fontAlgn="base">
+                <a:lnSpc>
+                  <a:spcPct val="90000"/>
+                </a:lnSpc>
+                <a:spcBef>
+                  <a:spcPct val="0"/>
+                </a:spcBef>
+                <a:spcAft>
+                  <a:spcPct val="0"/>
+                </a:spcAft>
+                <a:buFont typeface="Arial" panose="020B0604020202020204" pitchFamily="34" charset="0"/>
+                <a:buChar char="•"/>
+              </a:pPr>
+              <a:r>
+                <a:rPr lang="en-CA" sz="800" dirty="0">
+                  <a:solidFill>
+                    <a:srgbClr val="0070C0"/>
+                  </a:solidFill>
+                  <a:ea typeface="Segoe UI" pitchFamily="34" charset="0"/>
+                  <a:cs typeface="Segoe UI" pitchFamily="34" charset="0"/>
+                </a:rPr>
+                <a:t>Horizontal Scaling – add / resource resources</a:t>
+              </a:r>
+            </a:p>
+            <a:p>
+              <a:pPr marL="269875" lvl="1" indent="-93663" defTabSz="932472" fontAlgn="base">
+                <a:lnSpc>
+                  <a:spcPct val="90000"/>
+                </a:lnSpc>
+                <a:spcBef>
+                  <a:spcPct val="0"/>
+                </a:spcBef>
+                <a:spcAft>
+                  <a:spcPct val="0"/>
+                </a:spcAft>
+                <a:buFont typeface="Arial" panose="020B0604020202020204" pitchFamily="34" charset="0"/>
+                <a:buChar char="•"/>
+              </a:pPr>
+              <a:r>
+                <a:rPr lang="en-CA" sz="800" dirty="0">
+                  <a:solidFill>
+                    <a:srgbClr val="0070C0"/>
+                  </a:solidFill>
+                  <a:ea typeface="Segoe UI" pitchFamily="34" charset="0"/>
+                  <a:cs typeface="Segoe UI" pitchFamily="34" charset="0"/>
+                </a:rPr>
+                <a:t>Strategies</a:t>
+              </a:r>
+            </a:p>
+            <a:p>
+              <a:pPr marL="360363" lvl="1" indent="-93663" defTabSz="932472" fontAlgn="base">
+                <a:lnSpc>
+                  <a:spcPct val="90000"/>
+                </a:lnSpc>
+                <a:spcBef>
+                  <a:spcPct val="0"/>
+                </a:spcBef>
+                <a:spcAft>
+                  <a:spcPct val="0"/>
+                </a:spcAft>
+                <a:buFont typeface="Arial" panose="020B0604020202020204" pitchFamily="34" charset="0"/>
+                <a:buChar char="•"/>
+              </a:pPr>
+              <a:r>
+                <a:rPr lang="en-CA" sz="900" dirty="0">
+                  <a:solidFill>
+                    <a:srgbClr val="0070C0"/>
+                  </a:solidFill>
+                  <a:ea typeface="Segoe UI" pitchFamily="34" charset="0"/>
+                  <a:cs typeface="Segoe UI" pitchFamily="34" charset="0"/>
+                </a:rPr>
+                <a:t>Monitoring and alerting</a:t>
+              </a:r>
+            </a:p>
+            <a:p>
+              <a:pPr marL="360363" lvl="1" indent="-93663" defTabSz="932472" fontAlgn="base">
+                <a:lnSpc>
+                  <a:spcPct val="90000"/>
+                </a:lnSpc>
+                <a:spcBef>
+                  <a:spcPct val="0"/>
+                </a:spcBef>
+                <a:spcAft>
+                  <a:spcPct val="0"/>
+                </a:spcAft>
+                <a:buFont typeface="Arial" panose="020B0604020202020204" pitchFamily="34" charset="0"/>
+                <a:buChar char="•"/>
+              </a:pPr>
+              <a:r>
+                <a:rPr lang="en-CA" sz="900" dirty="0">
+                  <a:solidFill>
+                    <a:srgbClr val="0070C0"/>
+                  </a:solidFill>
+                  <a:ea typeface="Segoe UI" pitchFamily="34" charset="0"/>
+                  <a:cs typeface="Segoe UI" pitchFamily="34" charset="0"/>
+                </a:rPr>
+                <a:t>Decision Making Logic – automation runbooks</a:t>
+              </a:r>
+            </a:p>
+            <a:p>
+              <a:pPr marL="360363" lvl="1" indent="-93663" defTabSz="932472" fontAlgn="base">
+                <a:lnSpc>
+                  <a:spcPct val="90000"/>
+                </a:lnSpc>
+                <a:spcBef>
+                  <a:spcPct val="0"/>
+                </a:spcBef>
+                <a:spcAft>
+                  <a:spcPct val="0"/>
+                </a:spcAft>
+                <a:buFont typeface="Arial" panose="020B0604020202020204" pitchFamily="34" charset="0"/>
+                <a:buChar char="•"/>
+              </a:pPr>
+              <a:r>
+                <a:rPr lang="en-CA" sz="900" dirty="0">
+                  <a:solidFill>
+                    <a:srgbClr val="0070C0"/>
+                  </a:solidFill>
+                  <a:ea typeface="Segoe UI" pitchFamily="34" charset="0"/>
+                  <a:cs typeface="Segoe UI" pitchFamily="34" charset="0"/>
+                </a:rPr>
+                <a:t>Az Monitoring Scale – integrated in Az Monitor</a:t>
+              </a:r>
+            </a:p>
+            <a:p>
+              <a:pPr marL="360363" lvl="1" indent="-93663" defTabSz="932472" fontAlgn="base">
+                <a:lnSpc>
+                  <a:spcPct val="90000"/>
+                </a:lnSpc>
+                <a:spcBef>
+                  <a:spcPct val="0"/>
+                </a:spcBef>
+                <a:spcAft>
+                  <a:spcPct val="0"/>
+                </a:spcAft>
+                <a:buFont typeface="Arial" panose="020B0604020202020204" pitchFamily="34" charset="0"/>
+                <a:buChar char="•"/>
+              </a:pPr>
+              <a:r>
+                <a:rPr lang="en-CA" sz="900" dirty="0">
+                  <a:solidFill>
+                    <a:srgbClr val="0070C0"/>
+                  </a:solidFill>
+                  <a:ea typeface="Segoe UI" pitchFamily="34" charset="0"/>
+                  <a:cs typeface="Segoe UI" pitchFamily="34" charset="0"/>
+                </a:rPr>
+                <a:t>App Architectures – Service Fabric scales horizontally</a:t>
+              </a:r>
             </a:p>
           </p:txBody>
         </p:sp>
@@ -36454,55 +36951,6 @@
           </p:sp>
         </p:grpSp>
       </p:grpSp>
-      <p:pic>
-        <p:nvPicPr>
-          <p:cNvPr id="144" name="Picture 143">
-            <a:extLst>
-              <a:ext uri="{FF2B5EF4-FFF2-40B4-BE49-F238E27FC236}">
-                <a16:creationId xmlns:a16="http://schemas.microsoft.com/office/drawing/2014/main" id="{6A95A07F-5171-4F9A-9177-794BE8AF4361}"/>
-              </a:ext>
-            </a:extLst>
-          </p:cNvPr>
-          <p:cNvPicPr>
-            <a:picLocks noChangeAspect="1"/>
-          </p:cNvPicPr>
-          <p:nvPr/>
-        </p:nvPicPr>
-        <p:blipFill>
-          <a:blip r:embed="rId3">
-            <a:clrChange>
-              <a:clrFrom>
-                <a:srgbClr val="FFFFFF"/>
-              </a:clrFrom>
-              <a:clrTo>
-                <a:srgbClr val="FFFFFF">
-                  <a:alpha val="0"/>
-                </a:srgbClr>
-              </a:clrTo>
-            </a:clrChange>
-            <a:extLst>
-              <a:ext uri="{28A0092B-C50C-407E-A947-70E740481C1C}">
-                <a14:useLocalDpi xmlns:a14="http://schemas.microsoft.com/office/drawing/2010/main" val="0"/>
-              </a:ext>
-              <a:ext uri="{837473B0-CC2E-450A-ABE3-18F120FF3D39}">
-                <a1611:picAttrSrcUrl xmlns:a1611="http://schemas.microsoft.com/office/drawing/2016/11/main" r:id="rId4"/>
-              </a:ext>
-            </a:extLst>
-          </a:blip>
-          <a:stretch>
-            <a:fillRect/>
-          </a:stretch>
-        </p:blipFill>
-        <p:spPr>
-          <a:xfrm rot="1684251">
-            <a:off x="11575536" y="2460575"/>
-            <a:ext cx="9982821" cy="3150828"/>
-          </a:xfrm>
-          <a:prstGeom prst="rect">
-            <a:avLst/>
-          </a:prstGeom>
-        </p:spPr>
-      </p:pic>
     </p:spTree>
     <p:extLst>
       <p:ext uri="{BB962C8B-B14F-4D97-AF65-F5344CB8AC3E}">
@@ -38114,34 +38562,6 @@
 </file>
 
 <file path=customXml/item1.xml><?xml version="1.0" encoding="utf-8"?>
-<?mso-contentType ?>
-<FormTemplates xmlns="http://schemas.microsoft.com/sharepoint/v3/contenttype/forms">
-  <Display>DocumentLibraryForm</Display>
-  <Edit>DocumentLibraryForm</Edit>
-  <New>DocumentLibraryForm</New>
-</FormTemplates>
-</file>
-
-<file path=customXml/item2.xml><?xml version="1.0" encoding="utf-8"?>
-<?mso-contentType ?>
-<FormTemplates xmlns="http://schemas.microsoft.com/sharepoint/v3/contenttype/forms">
-  <Display>DocumentLibraryForm</Display>
-  <Edit>DocumentLibraryForm</Edit>
-  <New>DocumentLibraryForm</New>
-</FormTemplates>
-</file>
-
-<file path=customXml/item3.xml><?xml version="1.0" encoding="utf-8"?>
-<p:properties xmlns:p="http://schemas.microsoft.com/office/2006/metadata/properties" xmlns:xsi="http://www.w3.org/2001/XMLSchema-instance" xmlns:pc="http://schemas.microsoft.com/office/infopath/2007/PartnerControls">
-  <documentManagement>
-    <_ip_UnifiedCompliancePolicyUIAction xmlns="http://schemas.microsoft.com/sharepoint/v3" xsi:nil="true"/>
-    <IconOverlay xmlns="http://schemas.microsoft.com/sharepoint/v4" xsi:nil="true"/>
-    <_ip_UnifiedCompliancePolicyProperties xmlns="http://schemas.microsoft.com/sharepoint/v3" xsi:nil="true"/>
-  </documentManagement>
-</p:properties>
-</file>
-
-<file path=customXml/item4.xml><?xml version="1.0" encoding="utf-8"?>
 <ct:contentTypeSchema xmlns:ct="http://schemas.microsoft.com/office/2006/metadata/contentType" xmlns:ma="http://schemas.microsoft.com/office/2006/metadata/properties/metaAttributes" ct:_="" ma:_="" ma:contentTypeName="Document" ma:contentTypeID="0x010100F5F187B9059DF945B25AB5B2F3BA0895" ma:contentTypeVersion="14" ma:contentTypeDescription="Create a new document." ma:contentTypeScope="" ma:versionID="be2c86c74b3bb227d6f27514678f23d5">
   <xsd:schema xmlns:xsd="http://www.w3.org/2001/XMLSchema" xmlns:xs="http://www.w3.org/2001/XMLSchema" xmlns:p="http://schemas.microsoft.com/office/2006/metadata/properties" xmlns:ns1="http://schemas.microsoft.com/sharepoint/v3" xmlns:ns2="af610f50-4aee-43ff-9d65-64420adb70d2" xmlns:ns3="http://schemas.microsoft.com/sharepoint/v4" xmlns:ns4="15c98cf3-0896-4040-874f-f436925621df" targetNamespace="http://schemas.microsoft.com/office/2006/metadata/properties" ma:root="true" ma:fieldsID="94136e9e548b6d3962354304dc946cac" ns1:_="" ns2:_="" ns3:_="" ns4:_="">
     <xsd:import namespace="http://schemas.microsoft.com/sharepoint/v3"/>
@@ -38380,34 +38800,35 @@
 </ct:contentTypeSchema>
 </file>
 
-<file path=customXml/itemProps1.xml><?xml version="1.0" encoding="utf-8"?>
-<ds:datastoreItem xmlns:ds="http://schemas.openxmlformats.org/officeDocument/2006/customXml" ds:itemID="{E37CEF67-DE3E-432B-9E16-FF411AFDFA38}">
-  <ds:schemaRefs>
-    <ds:schemaRef ds:uri="http://schemas.microsoft.com/sharepoint/v3/contenttype/forms"/>
-  </ds:schemaRefs>
-</ds:datastoreItem>
+<file path=customXml/item2.xml><?xml version="1.0" encoding="utf-8"?>
+<p:properties xmlns:p="http://schemas.microsoft.com/office/2006/metadata/properties" xmlns:xsi="http://www.w3.org/2001/XMLSchema-instance" xmlns:pc="http://schemas.microsoft.com/office/infopath/2007/PartnerControls">
+  <documentManagement>
+    <_ip_UnifiedCompliancePolicyUIAction xmlns="http://schemas.microsoft.com/sharepoint/v3" xsi:nil="true"/>
+    <IconOverlay xmlns="http://schemas.microsoft.com/sharepoint/v4" xsi:nil="true"/>
+    <_ip_UnifiedCompliancePolicyProperties xmlns="http://schemas.microsoft.com/sharepoint/v3" xsi:nil="true"/>
+  </documentManagement>
+</p:properties>
 </file>
 
-<file path=customXml/itemProps2.xml><?xml version="1.0" encoding="utf-8"?>
-<ds:datastoreItem xmlns:ds="http://schemas.openxmlformats.org/officeDocument/2006/customXml" ds:itemID="{89C46102-D426-4E73-8F6F-5286B23D2EEB}">
-  <ds:schemaRefs>
-    <ds:schemaRef ds:uri="http://schemas.microsoft.com/sharepoint/v3/contenttype/forms"/>
-  </ds:schemaRefs>
-</ds:datastoreItem>
+<file path=customXml/item3.xml><?xml version="1.0" encoding="utf-8"?>
+<?mso-contentType ?>
+<FormTemplates xmlns="http://schemas.microsoft.com/sharepoint/v3/contenttype/forms">
+  <Display>DocumentLibraryForm</Display>
+  <Edit>DocumentLibraryForm</Edit>
+  <New>DocumentLibraryForm</New>
+</FormTemplates>
 </file>
 
-<file path=customXml/itemProps3.xml><?xml version="1.0" encoding="utf-8"?>
-<ds:datastoreItem xmlns:ds="http://schemas.openxmlformats.org/officeDocument/2006/customXml" ds:itemID="{C66C01A9-0361-4788-ABEE-257A7848F8D9}">
-  <ds:schemaRefs>
-    <ds:schemaRef ds:uri="http://schemas.microsoft.com/office/2006/metadata/properties"/>
-    <ds:schemaRef ds:uri="http://schemas.microsoft.com/office/infopath/2007/PartnerControls"/>
-    <ds:schemaRef ds:uri="http://schemas.microsoft.com/sharepoint/v3"/>
-    <ds:schemaRef ds:uri="http://schemas.microsoft.com/sharepoint/v4"/>
-  </ds:schemaRefs>
-</ds:datastoreItem>
+<file path=customXml/item4.xml><?xml version="1.0" encoding="utf-8"?>
+<?mso-contentType ?>
+<FormTemplates xmlns="http://schemas.microsoft.com/sharepoint/v3/contenttype/forms">
+  <Display>DocumentLibraryForm</Display>
+  <Edit>DocumentLibraryForm</Edit>
+  <New>DocumentLibraryForm</New>
+</FormTemplates>
 </file>
 
-<file path=customXml/itemProps4.xml><?xml version="1.0" encoding="utf-8"?>
+<file path=customXml/itemProps1.xml><?xml version="1.0" encoding="utf-8"?>
 <ds:datastoreItem xmlns:ds="http://schemas.openxmlformats.org/officeDocument/2006/customXml" ds:itemID="{30BD28E6-9582-48F2-A1BB-45FE2A6D90A2}">
   <ds:schemaRefs>
     <ds:schemaRef ds:uri="http://schemas.microsoft.com/office/2006/metadata/contentType"/>
@@ -38426,4 +38847,39 @@
     <ds:schemaRef ds:uri="http://schemas.microsoft.com/internal/obd"/>
   </ds:schemaRefs>
 </ds:datastoreItem>
+</file>
+
+<file path=customXml/itemProps2.xml><?xml version="1.0" encoding="utf-8"?>
+<ds:datastoreItem xmlns:ds="http://schemas.openxmlformats.org/officeDocument/2006/customXml" ds:itemID="{C66C01A9-0361-4788-ABEE-257A7848F8D9}">
+  <ds:schemaRefs>
+    <ds:schemaRef ds:uri="15c98cf3-0896-4040-874f-f436925621df"/>
+    <ds:schemaRef ds:uri="http://schemas.microsoft.com/office/2006/metadata/properties"/>
+    <ds:schemaRef ds:uri="http://schemas.microsoft.com/office/2006/documentManagement/types"/>
+    <ds:schemaRef ds:uri="http://purl.org/dc/terms/"/>
+    <ds:schemaRef ds:uri="http://schemas.microsoft.com/sharepoint/v4"/>
+    <ds:schemaRef ds:uri="http://purl.org/dc/elements/1.1/"/>
+    <ds:schemaRef ds:uri="http://purl.org/dc/dcmitype/"/>
+    <ds:schemaRef ds:uri="http://schemas.microsoft.com/office/infopath/2007/PartnerControls"/>
+    <ds:schemaRef ds:uri="http://schemas.openxmlformats.org/package/2006/metadata/core-properties"/>
+    <ds:schemaRef ds:uri="af610f50-4aee-43ff-9d65-64420adb70d2"/>
+    <ds:schemaRef ds:uri="http://schemas.microsoft.com/sharepoint/v3"/>
+    <ds:schemaRef ds:uri="http://www.w3.org/XML/1998/namespace"/>
+  </ds:schemaRefs>
+</ds:datastoreItem>
+</file>
+
+<file path=customXml/itemProps3.xml><?xml version="1.0" encoding="utf-8"?>
+<ds:datastoreItem xmlns:ds="http://schemas.openxmlformats.org/officeDocument/2006/customXml" ds:itemID="{89C46102-D426-4E73-8F6F-5286B23D2EEB}">
+  <ds:schemaRefs>
+    <ds:schemaRef ds:uri="http://schemas.microsoft.com/sharepoint/v3/contenttype/forms"/>
+  </ds:schemaRefs>
+</ds:datastoreItem>
+</file>
+
+<file path=customXml/itemProps4.xml><?xml version="1.0" encoding="utf-8"?>
+<ds:datastoreItem xmlns:ds="http://schemas.openxmlformats.org/officeDocument/2006/customXml" ds:itemID="{E37CEF67-DE3E-432B-9E16-FF411AFDFA38}">
+  <ds:schemaRefs>
+    <ds:schemaRef ds:uri="http://schemas.microsoft.com/sharepoint/v3/contenttype/forms"/>
+  </ds:schemaRefs>
+</ds:datastoreItem>
 </file>
</xml_diff>

<commit_message>
Update IaaS and Service Bus sections
</commit_message>
<xml_diff>
--- a/src/azure/architecting-microsoft-azure-solutions.pptx
+++ b/src/azure/architecting-microsoft-azure-solutions.pptx
@@ -127,7 +127,7 @@
 <file path=ppt/revisionInfo.xml><?xml version="1.0" encoding="utf-8"?>
 <p1510:revInfo xmlns:a="http://schemas.openxmlformats.org/drawingml/2006/main" xmlns:r="http://schemas.openxmlformats.org/officeDocument/2006/relationships" xmlns:p1510="http://schemas.microsoft.com/office/powerpoint/2015/10/main">
   <p1510:revLst>
-    <p1510:client id="{91EC4AA3-DD00-44DC-A9B8-0A8AD6262E8D}" v="11092" dt="2018-10-06T01:29:10.104"/>
+    <p1510:client id="{91EC4AA3-DD00-44DC-A9B8-0A8AD6262E8D}" v="11096" dt="2018-10-16T02:13:19.203"/>
   </p1510:revLst>
 </p1510:revInfo>
 </file>
@@ -214,7 +214,7 @@
           <a:p>
             <a:fld id="{2F4766DD-CA99-4D5F-A9B2-EF5EF0A37C93}" type="datetimeFigureOut">
               <a:rPr lang="en-CA" smtClean="0"/>
-              <a:t>2018-10-06</a:t>
+              <a:t>2018-10-15</a:t>
             </a:fld>
             <a:endParaRPr lang="en-CA"/>
           </a:p>
@@ -566,7 +566,7 @@
           <a:p>
             <a:fld id="{D18B56EA-E28F-4F92-9F16-7A6F2501B303}" type="datetime8">
               <a:rPr lang="en-US" smtClean="0"/>
-              <a:t>10/6/2018 8:12 AM</a:t>
+              <a:t>10/15/2018 7:13 PM</a:t>
             </a:fld>
             <a:endParaRPr lang="en-US" dirty="0"/>
           </a:p>
@@ -5509,7 +5509,7 @@
           <a:p>
             <a:fld id="{ED6EB527-6926-47A2-AB35-8907638AD74C}" type="datetimeFigureOut">
               <a:rPr lang="en-CA" smtClean="0"/>
-              <a:t>2018-10-06</a:t>
+              <a:t>2018-10-15</a:t>
             </a:fld>
             <a:endParaRPr lang="en-CA"/>
           </a:p>
@@ -18126,7 +18126,7 @@
                 </a:r>
               </a:p>
               <a:p>
-                <a:pPr marL="360363" lvl="1" indent="-184150" defTabSz="932472" fontAlgn="base">
+                <a:pPr marL="360363" lvl="1" indent="-184150" defTabSz="1163638" fontAlgn="base">
                   <a:lnSpc>
                     <a:spcPct val="90000"/>
                   </a:lnSpc>
@@ -18147,7 +18147,7 @@
                     <a:ea typeface="Segoe UI" pitchFamily="34" charset="0"/>
                     <a:cs typeface="Segoe UI" pitchFamily="34" charset="0"/>
                   </a:rPr>
-                  <a:t>A 	General purpose</a:t>
+                  <a:t>A0-7, Av2, B 	General purpose</a:t>
                 </a:r>
               </a:p>
               <a:p>
@@ -18163,6 +18163,9 @@
                   </a:spcAft>
                   <a:buFont typeface="Arial" panose="020B0604020202020204" pitchFamily="34" charset="0"/>
                   <a:buChar char="•"/>
+                  <a:tabLst>
+                    <a:tab pos="1163638" algn="l"/>
+                  </a:tabLst>
                 </a:pPr>
                 <a:r>
                   <a:rPr lang="en-CA" sz="800" dirty="0">
@@ -18188,6 +18191,9 @@
                   </a:spcAft>
                   <a:buFont typeface="Arial" panose="020B0604020202020204" pitchFamily="34" charset="0"/>
                   <a:buChar char="•"/>
+                  <a:tabLst>
+                    <a:tab pos="1163638" algn="l"/>
+                  </a:tabLst>
                 </a:pPr>
                 <a:r>
                   <a:rPr lang="en-CA" sz="800" dirty="0">
@@ -18213,6 +18219,9 @@
                   </a:spcAft>
                   <a:buFont typeface="Arial" panose="020B0604020202020204" pitchFamily="34" charset="0"/>
                   <a:buChar char="•"/>
+                  <a:tabLst>
+                    <a:tab pos="1163638" algn="l"/>
+                  </a:tabLst>
                 </a:pPr>
                 <a:r>
                   <a:rPr lang="en-CA" sz="800" dirty="0">
@@ -18238,6 +18247,9 @@
                   </a:spcAft>
                   <a:buFont typeface="Arial" panose="020B0604020202020204" pitchFamily="34" charset="0"/>
                   <a:buChar char="•"/>
+                  <a:tabLst>
+                    <a:tab pos="1163638" algn="l"/>
+                  </a:tabLst>
                 </a:pPr>
                 <a:r>
                   <a:rPr lang="en-CA" sz="800" dirty="0">
@@ -18263,6 +18275,9 @@
                   </a:spcAft>
                   <a:buFont typeface="Arial" panose="020B0604020202020204" pitchFamily="34" charset="0"/>
                   <a:buChar char="•"/>
+                  <a:tabLst>
+                    <a:tab pos="1163638" algn="l"/>
+                  </a:tabLst>
                 </a:pPr>
                 <a:r>
                   <a:rPr lang="en-CA" sz="800" dirty="0">
@@ -18340,9 +18355,9 @@
           <p:grpSpPr>
             <a:xfrm>
               <a:off x="3780206" y="881287"/>
-              <a:ext cx="2986571" cy="2496297"/>
+              <a:ext cx="2986571" cy="2494372"/>
               <a:chOff x="4520351" y="881287"/>
-              <a:chExt cx="2986571" cy="2496297"/>
+              <a:chExt cx="2986571" cy="2494372"/>
             </a:xfrm>
           </p:grpSpPr>
           <p:sp>
@@ -18447,7 +18462,7 @@
             <p:spPr bwMode="auto">
               <a:xfrm>
                 <a:off x="4520352" y="1237886"/>
-                <a:ext cx="2986570" cy="2139698"/>
+                <a:ext cx="2986570" cy="2137773"/>
               </a:xfrm>
               <a:prstGeom prst="rect">
                 <a:avLst/>
@@ -18531,7 +18546,7 @@
                     <a:ea typeface="Segoe UI" pitchFamily="34" charset="0"/>
                     <a:cs typeface="Segoe UI" pitchFamily="34" charset="0"/>
                   </a:rPr>
-                  <a:t>A 	General purpose</a:t>
+                  <a:t>A8-11	General purpose</a:t>
                 </a:r>
               </a:p>
               <a:p>
@@ -18665,7 +18680,7 @@
                 </a:r>
               </a:p>
               <a:p>
-                <a:pPr defTabSz="932472" fontAlgn="base">
+                <a:pPr marL="0" lvl="1" defTabSz="932472" fontAlgn="base">
                   <a:lnSpc>
                     <a:spcPct val="90000"/>
                   </a:lnSpc>
@@ -18677,14 +18692,14 @@
                   </a:spcAft>
                 </a:pPr>
                 <a:r>
-                  <a:rPr lang="en-CA" sz="900" b="1" dirty="0">
+                  <a:rPr lang="en-CA" sz="800" b="1" dirty="0">
                     <a:solidFill>
                       <a:srgbClr val="0070C0"/>
                     </a:solidFill>
                     <a:ea typeface="Segoe UI" pitchFamily="34" charset="0"/>
                     <a:cs typeface="Segoe UI" pitchFamily="34" charset="0"/>
                   </a:rPr>
-                  <a:t>Cloud-native HPC solution</a:t>
+                  <a:t>Azure Batch</a:t>
                 </a:r>
               </a:p>
               <a:p>
@@ -18709,7 +18724,30 @@
                     <a:ea typeface="Segoe UI" pitchFamily="34" charset="0"/>
                     <a:cs typeface="Segoe UI" pitchFamily="34" charset="0"/>
                   </a:rPr>
-                  <a:t>HPC head node and compute nodes</a:t>
+                  <a:t>Most cost-effective option for scientific calculations</a:t>
+                </a:r>
+              </a:p>
+              <a:p>
+                <a:pPr defTabSz="932472" fontAlgn="base">
+                  <a:lnSpc>
+                    <a:spcPct val="90000"/>
+                  </a:lnSpc>
+                  <a:spcBef>
+                    <a:spcPct val="0"/>
+                  </a:spcBef>
+                  <a:spcAft>
+                    <a:spcPct val="0"/>
+                  </a:spcAft>
+                </a:pPr>
+                <a:r>
+                  <a:rPr lang="en-CA" sz="900" b="1" dirty="0">
+                    <a:solidFill>
+                      <a:srgbClr val="0070C0"/>
+                    </a:solidFill>
+                    <a:ea typeface="Segoe UI" pitchFamily="34" charset="0"/>
+                    <a:cs typeface="Segoe UI" pitchFamily="34" charset="0"/>
+                  </a:rPr>
+                  <a:t>Cloud-native HPC solution</a:t>
                 </a:r>
               </a:p>
               <a:p>
@@ -18734,7 +18772,7 @@
                     <a:ea typeface="Segoe UI" pitchFamily="34" charset="0"/>
                     <a:cs typeface="Segoe UI" pitchFamily="34" charset="0"/>
                   </a:rPr>
-                  <a:t>Virtual Machine Scale Sets (VMSS)</a:t>
+                  <a:t>HPC head node and compute nodes</a:t>
                 </a:r>
               </a:p>
               <a:p>
@@ -18759,7 +18797,7 @@
                     <a:ea typeface="Segoe UI" pitchFamily="34" charset="0"/>
                     <a:cs typeface="Segoe UI" pitchFamily="34" charset="0"/>
                   </a:rPr>
-                  <a:t>VMs using RDMA are placed in same VMSS</a:t>
+                  <a:t>Virtual Machine Scale Sets (VMSS)</a:t>
                 </a:r>
               </a:p>
               <a:p>
@@ -18784,7 +18822,7 @@
                     <a:ea typeface="Segoe UI" pitchFamily="34" charset="0"/>
                     <a:cs typeface="Segoe UI" pitchFamily="34" charset="0"/>
                   </a:rPr>
-                  <a:t>Virtual Network</a:t>
+                  <a:t>VMs using RDMA are placed in same VMSS</a:t>
                 </a:r>
               </a:p>
               <a:p>
@@ -18809,6 +18847,31 @@
                     <a:ea typeface="Segoe UI" pitchFamily="34" charset="0"/>
                     <a:cs typeface="Segoe UI" pitchFamily="34" charset="0"/>
                   </a:rPr>
+                  <a:t>Virtual Network</a:t>
+                </a:r>
+              </a:p>
+              <a:p>
+                <a:pPr marL="269875" lvl="1" indent="-93663" defTabSz="932472" fontAlgn="base">
+                  <a:lnSpc>
+                    <a:spcPct val="90000"/>
+                  </a:lnSpc>
+                  <a:spcBef>
+                    <a:spcPct val="0"/>
+                  </a:spcBef>
+                  <a:spcAft>
+                    <a:spcPct val="0"/>
+                  </a:spcAft>
+                  <a:buFont typeface="Arial" panose="020B0604020202020204" pitchFamily="34" charset="0"/>
+                  <a:buChar char="•"/>
+                </a:pPr>
+                <a:r>
+                  <a:rPr lang="en-CA" sz="800" dirty="0">
+                    <a:solidFill>
+                      <a:srgbClr val="0070C0"/>
+                    </a:solidFill>
+                    <a:ea typeface="Segoe UI" pitchFamily="34" charset="0"/>
+                    <a:cs typeface="Segoe UI" pitchFamily="34" charset="0"/>
+                  </a:rPr>
                   <a:t>Azure Blob Storage for node disks</a:t>
                 </a:r>
               </a:p>
@@ -18884,26 +18947,6 @@
                   </a:rPr>
                   <a:t>VPN Gateway endpoint between cloud and on-prem</a:t>
                 </a:r>
-              </a:p>
-              <a:p>
-                <a:pPr indent="-699808" defTabSz="932472" fontAlgn="base">
-                  <a:lnSpc>
-                    <a:spcPct val="90000"/>
-                  </a:lnSpc>
-                  <a:spcBef>
-                    <a:spcPct val="0"/>
-                  </a:spcBef>
-                  <a:spcAft>
-                    <a:spcPct val="0"/>
-                  </a:spcAft>
-                </a:pPr>
-                <a:endParaRPr lang="en-CA" sz="900" dirty="0">
-                  <a:solidFill>
-                    <a:srgbClr val="0070C0"/>
-                  </a:solidFill>
-                  <a:ea typeface="Segoe UI" pitchFamily="34" charset="0"/>
-                  <a:cs typeface="Segoe UI" pitchFamily="34" charset="0"/>
-                </a:endParaRPr>
               </a:p>
             </p:txBody>
           </p:sp>
@@ -37135,7 +37178,11 @@
             <a:noFill/>
           </a:ln>
           <a:effectLst>
-            <a:softEdge rad="112500"/>
+            <a:outerShdw blurRad="292100" dist="139700" dir="2700000" algn="tl" rotWithShape="0">
+              <a:srgbClr val="333333">
+                <a:alpha val="65000"/>
+              </a:srgbClr>
+            </a:outerShdw>
           </a:effectLst>
           <a:extLst>
             <a:ext uri="{909E8E84-426E-40DD-AFC4-6F175D3DCCD1}">
@@ -37647,7 +37694,11 @@
             <a:noFill/>
           </a:ln>
           <a:effectLst>
-            <a:softEdge rad="112500"/>
+            <a:outerShdw blurRad="292100" dist="139700" dir="2700000" algn="tl" rotWithShape="0">
+              <a:srgbClr val="333333">
+                <a:alpha val="65000"/>
+              </a:srgbClr>
+            </a:outerShdw>
           </a:effectLst>
           <a:extLst>
             <a:ext uri="{909E8E84-426E-40DD-AFC4-6F175D3DCCD1}">
@@ -37948,6 +37999,290 @@
           </a:p>
         </p:txBody>
       </p:sp>
+      <p:pic>
+        <p:nvPicPr>
+          <p:cNvPr id="3" name="Picture 2">
+            <a:extLst>
+              <a:ext uri="{FF2B5EF4-FFF2-40B4-BE49-F238E27FC236}">
+                <a16:creationId xmlns:a16="http://schemas.microsoft.com/office/drawing/2014/main" id="{1C58959A-7506-4961-96E3-C7B0AC0973B7}"/>
+              </a:ext>
+            </a:extLst>
+          </p:cNvPr>
+          <p:cNvPicPr>
+            <a:picLocks noChangeAspect="1"/>
+          </p:cNvPicPr>
+          <p:nvPr/>
+        </p:nvPicPr>
+        <p:blipFill>
+          <a:blip r:embed="rId9"/>
+          <a:stretch>
+            <a:fillRect/>
+          </a:stretch>
+        </p:blipFill>
+        <p:spPr>
+          <a:xfrm>
+            <a:off x="6186125" y="7630051"/>
+            <a:ext cx="1066726" cy="235381"/>
+          </a:xfrm>
+          <a:prstGeom prst="rect">
+            <a:avLst/>
+          </a:prstGeom>
+        </p:spPr>
+      </p:pic>
+      <p:pic>
+        <p:nvPicPr>
+          <p:cNvPr id="2" name="Picture 1">
+            <a:extLst>
+              <a:ext uri="{FF2B5EF4-FFF2-40B4-BE49-F238E27FC236}">
+                <a16:creationId xmlns:a16="http://schemas.microsoft.com/office/drawing/2014/main" id="{2FB763FA-89A1-40F8-BB15-83014478B63C}"/>
+              </a:ext>
+            </a:extLst>
+          </p:cNvPr>
+          <p:cNvPicPr>
+            <a:picLocks noChangeAspect="1"/>
+          </p:cNvPicPr>
+          <p:nvPr/>
+        </p:nvPicPr>
+        <p:blipFill>
+          <a:blip r:embed="rId10"/>
+          <a:stretch>
+            <a:fillRect/>
+          </a:stretch>
+        </p:blipFill>
+        <p:spPr>
+          <a:xfrm>
+            <a:off x="5570011" y="7612826"/>
+            <a:ext cx="1049140" cy="231060"/>
+          </a:xfrm>
+          <a:prstGeom prst="rect">
+            <a:avLst/>
+          </a:prstGeom>
+        </p:spPr>
+      </p:pic>
+      <p:pic>
+        <p:nvPicPr>
+          <p:cNvPr id="23" name="Picture 2" descr="Relational data &#10;Object-relational data &#10;Unstructured data &#10;Semi-structured data &#10;Queue messages &#10;Files On disk &#10;High-performance files on disk &#10;Store large data &#10;Store small data &#10;Geographic data replication &#10;x &#10;x &#10;x &#10;x &#10;x &#10;x &#10;x &#10;0 &#10;x &#10;x &#10;x &#10;x &#10;x &#10;x &#10;x &#10;x &#10;x &#10;x &#10;x &#10;x &#10;x &#10;x &#10;x &#10;x &#10;x ">
+            <a:extLst>
+              <a:ext uri="{FF2B5EF4-FFF2-40B4-BE49-F238E27FC236}">
+                <a16:creationId xmlns:a16="http://schemas.microsoft.com/office/drawing/2014/main" id="{BA6BFAAD-7AA9-4E8F-9FCA-37F2B5545E1E}"/>
+              </a:ext>
+            </a:extLst>
+          </p:cNvPr>
+          <p:cNvPicPr>
+            <a:picLocks noChangeAspect="1" noChangeArrowheads="1"/>
+          </p:cNvPicPr>
+          <p:nvPr/>
+        </p:nvPicPr>
+        <p:blipFill>
+          <a:blip r:embed="rId3">
+            <a:extLst>
+              <a:ext uri="{28A0092B-C50C-407E-A947-70E740481C1C}">
+                <a14:useLocalDpi xmlns:a14="http://schemas.microsoft.com/office/drawing/2010/main" val="0"/>
+              </a:ext>
+            </a:extLst>
+          </a:blip>
+          <a:srcRect/>
+          <a:stretch>
+            <a:fillRect/>
+          </a:stretch>
+        </p:blipFill>
+        <p:spPr bwMode="auto">
+          <a:xfrm>
+            <a:off x="359736" y="217615"/>
+            <a:ext cx="8015579" cy="4296002"/>
+          </a:xfrm>
+          <a:prstGeom prst="rect">
+            <a:avLst/>
+          </a:prstGeom>
+          <a:ln>
+            <a:noFill/>
+          </a:ln>
+          <a:effectLst>
+            <a:outerShdw blurRad="292100" dist="139700" dir="2700000" algn="tl" rotWithShape="0">
+              <a:srgbClr val="333333">
+                <a:alpha val="65000"/>
+              </a:srgbClr>
+            </a:outerShdw>
+          </a:effectLst>
+          <a:extLst>
+            <a:ext uri="{909E8E84-426E-40DD-AFC4-6F175D3DCCD1}">
+              <a14:hiddenFill xmlns:a14="http://schemas.microsoft.com/office/drawing/2010/main">
+                <a:solidFill>
+                  <a:srgbClr val="FFFFFF"/>
+                </a:solidFill>
+              </a14:hiddenFill>
+            </a:ext>
+          </a:extLst>
+        </p:spPr>
+      </p:pic>
+      <p:pic>
+        <p:nvPicPr>
+          <p:cNvPr id="24" name="Picture 8" descr="For production deployments of complex &#10;systems (with a container orchestrator) &#10;For running simple configurations &#10;(possibly without orchestrator) &#10;For long-running workloads on containers &#10;For short-running workloads on &#10;containers &#10;For orchestrating a system based on &#10;containers &#10;Orchestrating with open-source &#10;orchestrators (DC/OS Docker Swarm &#10;Kubernetes) &#10;Orchestrating with built-in orchestrator &#10;Azure Container &#10;Services &#10;x &#10;x &#10;x &#10;x &#10;Azure Container &#10;Instances &#10;x &#10;x &#10;Azure Service &#10;Fabric &#10;x &#10;x ">
+            <a:extLst>
+              <a:ext uri="{FF2B5EF4-FFF2-40B4-BE49-F238E27FC236}">
+                <a16:creationId xmlns:a16="http://schemas.microsoft.com/office/drawing/2014/main" id="{FA1D75EE-0D61-4AA9-AA5C-C13EC49CB6C3}"/>
+              </a:ext>
+            </a:extLst>
+          </p:cNvPr>
+          <p:cNvPicPr>
+            <a:picLocks noChangeAspect="1" noChangeArrowheads="1"/>
+          </p:cNvPicPr>
+          <p:nvPr/>
+        </p:nvPicPr>
+        <p:blipFill>
+          <a:blip r:embed="rId5">
+            <a:extLst>
+              <a:ext uri="{28A0092B-C50C-407E-A947-70E740481C1C}">
+                <a14:useLocalDpi xmlns:a14="http://schemas.microsoft.com/office/drawing/2010/main" val="0"/>
+              </a:ext>
+            </a:extLst>
+          </a:blip>
+          <a:srcRect/>
+          <a:stretch>
+            <a:fillRect/>
+          </a:stretch>
+        </p:blipFill>
+        <p:spPr bwMode="auto">
+          <a:xfrm>
+            <a:off x="359736" y="10902395"/>
+            <a:ext cx="8015579" cy="3894093"/>
+          </a:xfrm>
+          <a:prstGeom prst="rect">
+            <a:avLst/>
+          </a:prstGeom>
+          <a:ln>
+            <a:noFill/>
+          </a:ln>
+          <a:effectLst>
+            <a:outerShdw blurRad="292100" dist="139700" dir="2700000" algn="tl" rotWithShape="0">
+              <a:srgbClr val="333333">
+                <a:alpha val="65000"/>
+              </a:srgbClr>
+            </a:outerShdw>
+          </a:effectLst>
+          <a:extLst>
+            <a:ext uri="{909E8E84-426E-40DD-AFC4-6F175D3DCCD1}">
+              <a14:hiddenFill xmlns:a14="http://schemas.microsoft.com/office/drawing/2010/main">
+                <a:solidFill>
+                  <a:srgbClr val="FFFFFF"/>
+                </a:solidFill>
+              </a14:hiddenFill>
+            </a:ext>
+          </a:extLst>
+        </p:spPr>
+      </p:pic>
+      <p:pic>
+        <p:nvPicPr>
+          <p:cNvPr id="25" name="Picture 10" descr="Diagram of load-balancing architecture">
+            <a:extLst>
+              <a:ext uri="{FF2B5EF4-FFF2-40B4-BE49-F238E27FC236}">
+                <a16:creationId xmlns:a16="http://schemas.microsoft.com/office/drawing/2014/main" id="{3586B1CF-48D0-4D96-B445-FA14FAA0ED1C}"/>
+              </a:ext>
+            </a:extLst>
+          </p:cNvPr>
+          <p:cNvPicPr>
+            <a:picLocks noChangeAspect="1" noChangeArrowheads="1"/>
+          </p:cNvPicPr>
+          <p:nvPr/>
+        </p:nvPicPr>
+        <p:blipFill>
+          <a:blip r:embed="rId6" cstate="print">
+            <a:extLst>
+              <a:ext uri="{28A0092B-C50C-407E-A947-70E740481C1C}">
+                <a14:useLocalDpi xmlns:a14="http://schemas.microsoft.com/office/drawing/2010/main" val="0"/>
+              </a:ext>
+            </a:extLst>
+          </a:blip>
+          <a:srcRect/>
+          <a:stretch>
+            <a:fillRect/>
+          </a:stretch>
+        </p:blipFill>
+        <p:spPr bwMode="auto">
+          <a:xfrm>
+            <a:off x="10920027" y="8509116"/>
+            <a:ext cx="10242662" cy="6287372"/>
+          </a:xfrm>
+          <a:prstGeom prst="rect">
+            <a:avLst/>
+          </a:prstGeom>
+          <a:ln>
+            <a:noFill/>
+          </a:ln>
+          <a:effectLst>
+            <a:outerShdw blurRad="292100" dist="139700" dir="2700000" algn="tl" rotWithShape="0">
+              <a:srgbClr val="333333">
+                <a:alpha val="65000"/>
+              </a:srgbClr>
+            </a:outerShdw>
+          </a:effectLst>
+          <a:extLst>
+            <a:ext uri="{909E8E84-426E-40DD-AFC4-6F175D3DCCD1}">
+              <a14:hiddenFill xmlns:a14="http://schemas.microsoft.com/office/drawing/2010/main">
+                <a:solidFill>
+                  <a:srgbClr val="FFFFFF"/>
+                </a:solidFill>
+              </a14:hiddenFill>
+            </a:ext>
+          </a:extLst>
+        </p:spPr>
+      </p:pic>
+      <p:pic>
+        <p:nvPicPr>
+          <p:cNvPr id="28" name="Picture 12" descr="Tec h &#10;Application &#10;Endpoints &#10;V net support &#10;Endpoint &#10;Monitoring &#10;Azu re &#10;T level (Layer Q) &#10;VMS and Cloud &#10;role instances &#10;Can used for both Internet &#10;facing and internal (Vnet) &#10;Supported via probes &#10;Applicaticm level (Layer J) &#10;HTTP and HTTPS &#10;Any Azure IP address or &#10;public internet IP address &#10;Can be used for both Internet &#10;facing and internal (Vnet) &#10;Supported via probes &#10;Traffic &#10;Any (An HTTP endpoint is &#10;required for endpoint &#10;monitoring) &#10;Azure VMS. Cloud Services. Azure &#10;Web Apps, and external &#10;endpoints &#10;Only supports Internet-facing &#10;applications &#10;Supported via HTTP/HTTPS GET ">
+            <a:extLst>
+              <a:ext uri="{FF2B5EF4-FFF2-40B4-BE49-F238E27FC236}">
+                <a16:creationId xmlns:a16="http://schemas.microsoft.com/office/drawing/2014/main" id="{DE02346C-B87D-4836-BCA1-1FF3FE9D0BD0}"/>
+              </a:ext>
+            </a:extLst>
+          </p:cNvPr>
+          <p:cNvPicPr>
+            <a:picLocks noChangeAspect="1" noChangeArrowheads="1"/>
+          </p:cNvPicPr>
+          <p:nvPr/>
+        </p:nvPicPr>
+        <p:blipFill>
+          <a:blip r:embed="rId7">
+            <a:extLst>
+              <a:ext uri="{28A0092B-C50C-407E-A947-70E740481C1C}">
+                <a14:useLocalDpi xmlns:a14="http://schemas.microsoft.com/office/drawing/2010/main" val="0"/>
+              </a:ext>
+            </a:extLst>
+          </a:blip>
+          <a:srcRect/>
+          <a:stretch>
+            <a:fillRect/>
+          </a:stretch>
+        </p:blipFill>
+        <p:spPr bwMode="auto">
+          <a:xfrm>
+            <a:off x="10822179" y="208006"/>
+            <a:ext cx="10340510" cy="5632351"/>
+          </a:xfrm>
+          <a:prstGeom prst="rect">
+            <a:avLst/>
+          </a:prstGeom>
+          <a:ln>
+            <a:noFill/>
+          </a:ln>
+          <a:effectLst>
+            <a:outerShdw blurRad="292100" dist="139700" dir="2700000" algn="tl" rotWithShape="0">
+              <a:srgbClr val="333333">
+                <a:alpha val="65000"/>
+              </a:srgbClr>
+            </a:outerShdw>
+          </a:effectLst>
+          <a:extLst>
+            <a:ext uri="{909E8E84-426E-40DD-AFC4-6F175D3DCCD1}">
+              <a14:hiddenFill xmlns:a14="http://schemas.microsoft.com/office/drawing/2010/main">
+                <a:solidFill>
+                  <a:srgbClr val="FFFFFF"/>
+                </a:solidFill>
+              </a14:hiddenFill>
+            </a:ext>
+          </a:extLst>
+        </p:spPr>
+      </p:pic>
     </p:spTree>
     <p:extLst>
       <p:ext uri="{BB962C8B-B14F-4D97-AF65-F5344CB8AC3E}">
@@ -38562,6 +38897,34 @@
 </file>
 
 <file path=customXml/item1.xml><?xml version="1.0" encoding="utf-8"?>
+<?mso-contentType ?>
+<FormTemplates xmlns="http://schemas.microsoft.com/sharepoint/v3/contenttype/forms">
+  <Display>DocumentLibraryForm</Display>
+  <Edit>DocumentLibraryForm</Edit>
+  <New>DocumentLibraryForm</New>
+</FormTemplates>
+</file>
+
+<file path=customXml/item2.xml><?xml version="1.0" encoding="utf-8"?>
+<?mso-contentType ?>
+<FormTemplates xmlns="http://schemas.microsoft.com/sharepoint/v3/contenttype/forms">
+  <Display>DocumentLibraryForm</Display>
+  <Edit>DocumentLibraryForm</Edit>
+  <New>DocumentLibraryForm</New>
+</FormTemplates>
+</file>
+
+<file path=customXml/item3.xml><?xml version="1.0" encoding="utf-8"?>
+<p:properties xmlns:p="http://schemas.microsoft.com/office/2006/metadata/properties" xmlns:xsi="http://www.w3.org/2001/XMLSchema-instance" xmlns:pc="http://schemas.microsoft.com/office/infopath/2007/PartnerControls">
+  <documentManagement>
+    <_ip_UnifiedCompliancePolicyUIAction xmlns="http://schemas.microsoft.com/sharepoint/v3" xsi:nil="true"/>
+    <IconOverlay xmlns="http://schemas.microsoft.com/sharepoint/v4" xsi:nil="true"/>
+    <_ip_UnifiedCompliancePolicyProperties xmlns="http://schemas.microsoft.com/sharepoint/v3" xsi:nil="true"/>
+  </documentManagement>
+</p:properties>
+</file>
+
+<file path=customXml/item4.xml><?xml version="1.0" encoding="utf-8"?>
 <ct:contentTypeSchema xmlns:ct="http://schemas.microsoft.com/office/2006/metadata/contentType" xmlns:ma="http://schemas.microsoft.com/office/2006/metadata/properties/metaAttributes" ct:_="" ma:_="" ma:contentTypeName="Document" ma:contentTypeID="0x010100F5F187B9059DF945B25AB5B2F3BA0895" ma:contentTypeVersion="14" ma:contentTypeDescription="Create a new document." ma:contentTypeScope="" ma:versionID="be2c86c74b3bb227d6f27514678f23d5">
   <xsd:schema xmlns:xsd="http://www.w3.org/2001/XMLSchema" xmlns:xs="http://www.w3.org/2001/XMLSchema" xmlns:p="http://schemas.microsoft.com/office/2006/metadata/properties" xmlns:ns1="http://schemas.microsoft.com/sharepoint/v3" xmlns:ns2="af610f50-4aee-43ff-9d65-64420adb70d2" xmlns:ns3="http://schemas.microsoft.com/sharepoint/v4" xmlns:ns4="15c98cf3-0896-4040-874f-f436925621df" targetNamespace="http://schemas.microsoft.com/office/2006/metadata/properties" ma:root="true" ma:fieldsID="94136e9e548b6d3962354304dc946cac" ns1:_="" ns2:_="" ns3:_="" ns4:_="">
     <xsd:import namespace="http://schemas.microsoft.com/sharepoint/v3"/>
@@ -38800,35 +39163,34 @@
 </ct:contentTypeSchema>
 </file>
 
-<file path=customXml/item2.xml><?xml version="1.0" encoding="utf-8"?>
-<p:properties xmlns:p="http://schemas.microsoft.com/office/2006/metadata/properties" xmlns:xsi="http://www.w3.org/2001/XMLSchema-instance" xmlns:pc="http://schemas.microsoft.com/office/infopath/2007/PartnerControls">
-  <documentManagement>
-    <_ip_UnifiedCompliancePolicyUIAction xmlns="http://schemas.microsoft.com/sharepoint/v3" xsi:nil="true"/>
-    <IconOverlay xmlns="http://schemas.microsoft.com/sharepoint/v4" xsi:nil="true"/>
-    <_ip_UnifiedCompliancePolicyProperties xmlns="http://schemas.microsoft.com/sharepoint/v3" xsi:nil="true"/>
-  </documentManagement>
-</p:properties>
+<file path=customXml/itemProps1.xml><?xml version="1.0" encoding="utf-8"?>
+<ds:datastoreItem xmlns:ds="http://schemas.openxmlformats.org/officeDocument/2006/customXml" ds:itemID="{E37CEF67-DE3E-432B-9E16-FF411AFDFA38}">
+  <ds:schemaRefs>
+    <ds:schemaRef ds:uri="http://schemas.microsoft.com/sharepoint/v3/contenttype/forms"/>
+  </ds:schemaRefs>
+</ds:datastoreItem>
 </file>
 
-<file path=customXml/item3.xml><?xml version="1.0" encoding="utf-8"?>
-<?mso-contentType ?>
-<FormTemplates xmlns="http://schemas.microsoft.com/sharepoint/v3/contenttype/forms">
-  <Display>DocumentLibraryForm</Display>
-  <Edit>DocumentLibraryForm</Edit>
-  <New>DocumentLibraryForm</New>
-</FormTemplates>
+<file path=customXml/itemProps2.xml><?xml version="1.0" encoding="utf-8"?>
+<ds:datastoreItem xmlns:ds="http://schemas.openxmlformats.org/officeDocument/2006/customXml" ds:itemID="{89C46102-D426-4E73-8F6F-5286B23D2EEB}">
+  <ds:schemaRefs>
+    <ds:schemaRef ds:uri="http://schemas.microsoft.com/sharepoint/v3/contenttype/forms"/>
+  </ds:schemaRefs>
+</ds:datastoreItem>
 </file>
 
-<file path=customXml/item4.xml><?xml version="1.0" encoding="utf-8"?>
-<?mso-contentType ?>
-<FormTemplates xmlns="http://schemas.microsoft.com/sharepoint/v3/contenttype/forms">
-  <Display>DocumentLibraryForm</Display>
-  <Edit>DocumentLibraryForm</Edit>
-  <New>DocumentLibraryForm</New>
-</FormTemplates>
+<file path=customXml/itemProps3.xml><?xml version="1.0" encoding="utf-8"?>
+<ds:datastoreItem xmlns:ds="http://schemas.openxmlformats.org/officeDocument/2006/customXml" ds:itemID="{C66C01A9-0361-4788-ABEE-257A7848F8D9}">
+  <ds:schemaRefs>
+    <ds:schemaRef ds:uri="http://schemas.microsoft.com/office/2006/metadata/properties"/>
+    <ds:schemaRef ds:uri="http://schemas.microsoft.com/office/infopath/2007/PartnerControls"/>
+    <ds:schemaRef ds:uri="http://schemas.microsoft.com/sharepoint/v3"/>
+    <ds:schemaRef ds:uri="http://schemas.microsoft.com/sharepoint/v4"/>
+  </ds:schemaRefs>
+</ds:datastoreItem>
 </file>
 
-<file path=customXml/itemProps1.xml><?xml version="1.0" encoding="utf-8"?>
+<file path=customXml/itemProps4.xml><?xml version="1.0" encoding="utf-8"?>
 <ds:datastoreItem xmlns:ds="http://schemas.openxmlformats.org/officeDocument/2006/customXml" ds:itemID="{30BD28E6-9582-48F2-A1BB-45FE2A6D90A2}">
   <ds:schemaRefs>
     <ds:schemaRef ds:uri="http://schemas.microsoft.com/office/2006/metadata/contentType"/>
@@ -38847,39 +39209,4 @@
     <ds:schemaRef ds:uri="http://schemas.microsoft.com/internal/obd"/>
   </ds:schemaRefs>
 </ds:datastoreItem>
-</file>
-
-<file path=customXml/itemProps2.xml><?xml version="1.0" encoding="utf-8"?>
-<ds:datastoreItem xmlns:ds="http://schemas.openxmlformats.org/officeDocument/2006/customXml" ds:itemID="{C66C01A9-0361-4788-ABEE-257A7848F8D9}">
-  <ds:schemaRefs>
-    <ds:schemaRef ds:uri="15c98cf3-0896-4040-874f-f436925621df"/>
-    <ds:schemaRef ds:uri="http://schemas.microsoft.com/office/2006/metadata/properties"/>
-    <ds:schemaRef ds:uri="http://schemas.microsoft.com/office/2006/documentManagement/types"/>
-    <ds:schemaRef ds:uri="http://purl.org/dc/terms/"/>
-    <ds:schemaRef ds:uri="http://schemas.microsoft.com/sharepoint/v4"/>
-    <ds:schemaRef ds:uri="http://purl.org/dc/elements/1.1/"/>
-    <ds:schemaRef ds:uri="http://purl.org/dc/dcmitype/"/>
-    <ds:schemaRef ds:uri="http://schemas.microsoft.com/office/infopath/2007/PartnerControls"/>
-    <ds:schemaRef ds:uri="http://schemas.openxmlformats.org/package/2006/metadata/core-properties"/>
-    <ds:schemaRef ds:uri="af610f50-4aee-43ff-9d65-64420adb70d2"/>
-    <ds:schemaRef ds:uri="http://schemas.microsoft.com/sharepoint/v3"/>
-    <ds:schemaRef ds:uri="http://www.w3.org/XML/1998/namespace"/>
-  </ds:schemaRefs>
-</ds:datastoreItem>
-</file>
-
-<file path=customXml/itemProps3.xml><?xml version="1.0" encoding="utf-8"?>
-<ds:datastoreItem xmlns:ds="http://schemas.openxmlformats.org/officeDocument/2006/customXml" ds:itemID="{89C46102-D426-4E73-8F6F-5286B23D2EEB}">
-  <ds:schemaRefs>
-    <ds:schemaRef ds:uri="http://schemas.microsoft.com/sharepoint/v3/contenttype/forms"/>
-  </ds:schemaRefs>
-</ds:datastoreItem>
-</file>
-
-<file path=customXml/itemProps4.xml><?xml version="1.0" encoding="utf-8"?>
-<ds:datastoreItem xmlns:ds="http://schemas.openxmlformats.org/officeDocument/2006/customXml" ds:itemID="{E37CEF67-DE3E-432B-9E16-FF411AFDFA38}">
-  <ds:schemaRefs>
-    <ds:schemaRef ds:uri="http://schemas.microsoft.com/sharepoint/v3/contenttype/forms"/>
-  </ds:schemaRefs>
-</ds:datastoreItem>
 </file>
</xml_diff>

<commit_message>
Update  serverless and micrososervices and networking sections
</commit_message>
<xml_diff>
--- a/src/azure/architecting-microsoft-azure-solutions.pptx
+++ b/src/azure/architecting-microsoft-azure-solutions.pptx
@@ -214,7 +214,7 @@
           <a:p>
             <a:fld id="{2F4766DD-CA99-4D5F-A9B2-EF5EF0A37C93}" type="datetimeFigureOut">
               <a:rPr lang="en-CA" smtClean="0"/>
-              <a:t>2018-10-15</a:t>
+              <a:t>2018-10-16</a:t>
             </a:fld>
             <a:endParaRPr lang="en-CA"/>
           </a:p>
@@ -566,7 +566,7 @@
           <a:p>
             <a:fld id="{D18B56EA-E28F-4F92-9F16-7A6F2501B303}" type="datetime8">
               <a:rPr lang="en-US" smtClean="0"/>
-              <a:t>10/15/2018 7:13 PM</a:t>
+              <a:t>10/16/2018 6:08 PM</a:t>
             </a:fld>
             <a:endParaRPr lang="en-US" dirty="0"/>
           </a:p>
@@ -5509,7 +5509,7 @@
           <a:p>
             <a:fld id="{ED6EB527-6926-47A2-AB35-8907638AD74C}" type="datetimeFigureOut">
               <a:rPr lang="en-CA" smtClean="0"/>
-              <a:t>2018-10-15</a:t>
+              <a:t>2018-10-16</a:t>
             </a:fld>
             <a:endParaRPr lang="en-CA"/>
           </a:p>
@@ -11503,8 +11503,8 @@
         </p:nvGrpSpPr>
         <p:grpSpPr>
           <a:xfrm>
-            <a:off x="17991879" y="11935845"/>
-            <a:ext cx="2986571" cy="2590348"/>
+            <a:off x="17991879" y="11931568"/>
+            <a:ext cx="2986571" cy="2594625"/>
             <a:chOff x="17987701" y="9447083"/>
             <a:chExt cx="2986571" cy="2590348"/>
           </a:xfrm>
@@ -12125,6 +12125,31 @@
                   <a:cs typeface="Segoe UI" pitchFamily="34" charset="0"/>
                 </a:rPr>
                 <a:t>Co-Located at Cloud Exchange – two cross connections</a:t>
+              </a:r>
+            </a:p>
+            <a:p>
+              <a:pPr marL="268288" lvl="1" indent="-92075" defTabSz="932472" fontAlgn="base">
+                <a:lnSpc>
+                  <a:spcPct val="90000"/>
+                </a:lnSpc>
+                <a:spcBef>
+                  <a:spcPct val="0"/>
+                </a:spcBef>
+                <a:spcAft>
+                  <a:spcPct val="0"/>
+                </a:spcAft>
+                <a:buFont typeface="Arial" panose="020B0604020202020204" pitchFamily="34" charset="0"/>
+                <a:buChar char="•"/>
+              </a:pPr>
+              <a:r>
+                <a:rPr lang="en-CA" sz="800" dirty="0">
+                  <a:solidFill>
+                    <a:srgbClr val="0070C0"/>
+                  </a:solidFill>
+                  <a:ea typeface="Segoe UI" pitchFamily="34" charset="0"/>
+                  <a:cs typeface="Segoe UI" pitchFamily="34" charset="0"/>
+                </a:rPr>
+                <a:t>Maximum 10GB</a:t>
               </a:r>
             </a:p>
           </p:txBody>
@@ -14197,7 +14222,7 @@
                   </a:solidFill>
                   <a:cs typeface="Segoe UI" pitchFamily="34" charset="0"/>
                 </a:rPr>
-                <a:t>ASP.NET, Core, Angular, React.js</a:t>
+                <a:t>ASP.NET, Core, Angular, React.js, Java, Python</a:t>
               </a:r>
             </a:p>
             <a:p>
@@ -38897,34 +38922,6 @@
 </file>
 
 <file path=customXml/item1.xml><?xml version="1.0" encoding="utf-8"?>
-<?mso-contentType ?>
-<FormTemplates xmlns="http://schemas.microsoft.com/sharepoint/v3/contenttype/forms">
-  <Display>DocumentLibraryForm</Display>
-  <Edit>DocumentLibraryForm</Edit>
-  <New>DocumentLibraryForm</New>
-</FormTemplates>
-</file>
-
-<file path=customXml/item2.xml><?xml version="1.0" encoding="utf-8"?>
-<?mso-contentType ?>
-<FormTemplates xmlns="http://schemas.microsoft.com/sharepoint/v3/contenttype/forms">
-  <Display>DocumentLibraryForm</Display>
-  <Edit>DocumentLibraryForm</Edit>
-  <New>DocumentLibraryForm</New>
-</FormTemplates>
-</file>
-
-<file path=customXml/item3.xml><?xml version="1.0" encoding="utf-8"?>
-<p:properties xmlns:p="http://schemas.microsoft.com/office/2006/metadata/properties" xmlns:xsi="http://www.w3.org/2001/XMLSchema-instance" xmlns:pc="http://schemas.microsoft.com/office/infopath/2007/PartnerControls">
-  <documentManagement>
-    <_ip_UnifiedCompliancePolicyUIAction xmlns="http://schemas.microsoft.com/sharepoint/v3" xsi:nil="true"/>
-    <IconOverlay xmlns="http://schemas.microsoft.com/sharepoint/v4" xsi:nil="true"/>
-    <_ip_UnifiedCompliancePolicyProperties xmlns="http://schemas.microsoft.com/sharepoint/v3" xsi:nil="true"/>
-  </documentManagement>
-</p:properties>
-</file>
-
-<file path=customXml/item4.xml><?xml version="1.0" encoding="utf-8"?>
 <ct:contentTypeSchema xmlns:ct="http://schemas.microsoft.com/office/2006/metadata/contentType" xmlns:ma="http://schemas.microsoft.com/office/2006/metadata/properties/metaAttributes" ct:_="" ma:_="" ma:contentTypeName="Document" ma:contentTypeID="0x010100F5F187B9059DF945B25AB5B2F3BA0895" ma:contentTypeVersion="14" ma:contentTypeDescription="Create a new document." ma:contentTypeScope="" ma:versionID="be2c86c74b3bb227d6f27514678f23d5">
   <xsd:schema xmlns:xsd="http://www.w3.org/2001/XMLSchema" xmlns:xs="http://www.w3.org/2001/XMLSchema" xmlns:p="http://schemas.microsoft.com/office/2006/metadata/properties" xmlns:ns1="http://schemas.microsoft.com/sharepoint/v3" xmlns:ns2="af610f50-4aee-43ff-9d65-64420adb70d2" xmlns:ns3="http://schemas.microsoft.com/sharepoint/v4" xmlns:ns4="15c98cf3-0896-4040-874f-f436925621df" targetNamespace="http://schemas.microsoft.com/office/2006/metadata/properties" ma:root="true" ma:fieldsID="94136e9e548b6d3962354304dc946cac" ns1:_="" ns2:_="" ns3:_="" ns4:_="">
     <xsd:import namespace="http://schemas.microsoft.com/sharepoint/v3"/>
@@ -39163,34 +39160,35 @@
 </ct:contentTypeSchema>
 </file>
 
-<file path=customXml/itemProps1.xml><?xml version="1.0" encoding="utf-8"?>
-<ds:datastoreItem xmlns:ds="http://schemas.openxmlformats.org/officeDocument/2006/customXml" ds:itemID="{E37CEF67-DE3E-432B-9E16-FF411AFDFA38}">
-  <ds:schemaRefs>
-    <ds:schemaRef ds:uri="http://schemas.microsoft.com/sharepoint/v3/contenttype/forms"/>
-  </ds:schemaRefs>
-</ds:datastoreItem>
+<file path=customXml/item2.xml><?xml version="1.0" encoding="utf-8"?>
+<p:properties xmlns:p="http://schemas.microsoft.com/office/2006/metadata/properties" xmlns:xsi="http://www.w3.org/2001/XMLSchema-instance" xmlns:pc="http://schemas.microsoft.com/office/infopath/2007/PartnerControls">
+  <documentManagement>
+    <_ip_UnifiedCompliancePolicyUIAction xmlns="http://schemas.microsoft.com/sharepoint/v3" xsi:nil="true"/>
+    <IconOverlay xmlns="http://schemas.microsoft.com/sharepoint/v4" xsi:nil="true"/>
+    <_ip_UnifiedCompliancePolicyProperties xmlns="http://schemas.microsoft.com/sharepoint/v3" xsi:nil="true"/>
+  </documentManagement>
+</p:properties>
 </file>
 
-<file path=customXml/itemProps2.xml><?xml version="1.0" encoding="utf-8"?>
-<ds:datastoreItem xmlns:ds="http://schemas.openxmlformats.org/officeDocument/2006/customXml" ds:itemID="{89C46102-D426-4E73-8F6F-5286B23D2EEB}">
-  <ds:schemaRefs>
-    <ds:schemaRef ds:uri="http://schemas.microsoft.com/sharepoint/v3/contenttype/forms"/>
-  </ds:schemaRefs>
-</ds:datastoreItem>
+<file path=customXml/item3.xml><?xml version="1.0" encoding="utf-8"?>
+<?mso-contentType ?>
+<FormTemplates xmlns="http://schemas.microsoft.com/sharepoint/v3/contenttype/forms">
+  <Display>DocumentLibraryForm</Display>
+  <Edit>DocumentLibraryForm</Edit>
+  <New>DocumentLibraryForm</New>
+</FormTemplates>
 </file>
 
-<file path=customXml/itemProps3.xml><?xml version="1.0" encoding="utf-8"?>
-<ds:datastoreItem xmlns:ds="http://schemas.openxmlformats.org/officeDocument/2006/customXml" ds:itemID="{C66C01A9-0361-4788-ABEE-257A7848F8D9}">
-  <ds:schemaRefs>
-    <ds:schemaRef ds:uri="http://schemas.microsoft.com/office/2006/metadata/properties"/>
-    <ds:schemaRef ds:uri="http://schemas.microsoft.com/office/infopath/2007/PartnerControls"/>
-    <ds:schemaRef ds:uri="http://schemas.microsoft.com/sharepoint/v3"/>
-    <ds:schemaRef ds:uri="http://schemas.microsoft.com/sharepoint/v4"/>
-  </ds:schemaRefs>
-</ds:datastoreItem>
+<file path=customXml/item4.xml><?xml version="1.0" encoding="utf-8"?>
+<?mso-contentType ?>
+<FormTemplates xmlns="http://schemas.microsoft.com/sharepoint/v3/contenttype/forms">
+  <Display>DocumentLibraryForm</Display>
+  <Edit>DocumentLibraryForm</Edit>
+  <New>DocumentLibraryForm</New>
+</FormTemplates>
 </file>
 
-<file path=customXml/itemProps4.xml><?xml version="1.0" encoding="utf-8"?>
+<file path=customXml/itemProps1.xml><?xml version="1.0" encoding="utf-8"?>
 <ds:datastoreItem xmlns:ds="http://schemas.openxmlformats.org/officeDocument/2006/customXml" ds:itemID="{30BD28E6-9582-48F2-A1BB-45FE2A6D90A2}">
   <ds:schemaRefs>
     <ds:schemaRef ds:uri="http://schemas.microsoft.com/office/2006/metadata/contentType"/>
@@ -39209,4 +39207,31 @@
     <ds:schemaRef ds:uri="http://schemas.microsoft.com/internal/obd"/>
   </ds:schemaRefs>
 </ds:datastoreItem>
+</file>
+
+<file path=customXml/itemProps2.xml><?xml version="1.0" encoding="utf-8"?>
+<ds:datastoreItem xmlns:ds="http://schemas.openxmlformats.org/officeDocument/2006/customXml" ds:itemID="{C66C01A9-0361-4788-ABEE-257A7848F8D9}">
+  <ds:schemaRefs>
+    <ds:schemaRef ds:uri="http://schemas.microsoft.com/office/2006/metadata/properties"/>
+    <ds:schemaRef ds:uri="http://schemas.microsoft.com/office/infopath/2007/PartnerControls"/>
+    <ds:schemaRef ds:uri="http://schemas.microsoft.com/sharepoint/v3"/>
+    <ds:schemaRef ds:uri="http://schemas.microsoft.com/sharepoint/v4"/>
+  </ds:schemaRefs>
+</ds:datastoreItem>
+</file>
+
+<file path=customXml/itemProps3.xml><?xml version="1.0" encoding="utf-8"?>
+<ds:datastoreItem xmlns:ds="http://schemas.openxmlformats.org/officeDocument/2006/customXml" ds:itemID="{89C46102-D426-4E73-8F6F-5286B23D2EEB}">
+  <ds:schemaRefs>
+    <ds:schemaRef ds:uri="http://schemas.microsoft.com/sharepoint/v3/contenttype/forms"/>
+  </ds:schemaRefs>
+</ds:datastoreItem>
+</file>
+
+<file path=customXml/itemProps4.xml><?xml version="1.0" encoding="utf-8"?>
+<ds:datastoreItem xmlns:ds="http://schemas.openxmlformats.org/officeDocument/2006/customXml" ds:itemID="{E37CEF67-DE3E-432B-9E16-FF411AFDFA38}">
+  <ds:schemaRefs>
+    <ds:schemaRef ds:uri="http://schemas.microsoft.com/sharepoint/v3/contenttype/forms"/>
+  </ds:schemaRefs>
+</ds:datastoreItem>
 </file>
</xml_diff>